<commit_message>
added week 2 day 1
</commit_message>
<xml_diff>
--- a/Learning Phase/Week 1/Day 4/Behavior-driven Development and Cucumber/Slides/6. Glue Code - Automating Scenarios/glue-code-automating-scenarios-slides.pptx
+++ b/Learning Phase/Week 1/Day 4/Behavior-driven Development and Cucumber/Slides/6. Glue Code - Automating Scenarios/glue-code-automating-scenarios-slides.pptx
@@ -243,7 +243,7 @@
           <a:p>
             <a:fld id="{67F630DD-2283-4222-BC51-87D59EBA5640}" type="datetimeFigureOut">
               <a:rPr lang="en-US" smtClean="0"/>
-              <a:t>10/11/2023</a:t>
+              <a:t>10/16/2023</a:t>
             </a:fld>
             <a:endParaRPr lang="en-US"/>
           </a:p>
@@ -649,7 +649,7 @@
           <a:p>
             <a:fld id="{64E44A8B-1544-45C4-8939-C9CB659040CE}" type="datetime1">
               <a:rPr lang="en-US" smtClean="0"/>
-              <a:t>10/11/2023</a:t>
+              <a:t>10/16/2023</a:t>
             </a:fld>
             <a:endParaRPr lang="en-US"/>
           </a:p>
@@ -882,7 +882,7 @@
           <a:p>
             <a:fld id="{1708B404-68F5-462C-BD35-49235B238974}" type="datetime1">
               <a:rPr lang="en-US" smtClean="0"/>
-              <a:t>10/11/2023</a:t>
+              <a:t>10/16/2023</a:t>
             </a:fld>
             <a:endParaRPr lang="en-US"/>
           </a:p>
@@ -1096,7 +1096,7 @@
           <a:p>
             <a:fld id="{3C2BA82B-4C1E-4CC3-9137-70EC1CF15856}" type="datetime1">
               <a:rPr lang="en-US" smtClean="0"/>
-              <a:t>10/11/2023</a:t>
+              <a:t>10/16/2023</a:t>
             </a:fld>
             <a:endParaRPr lang="en-US"/>
           </a:p>
@@ -1244,7 +1244,7 @@
           <a:p>
             <a:fld id="{7D9E32B2-4A22-4501-9DA9-4C30FF0DCCFF}" type="datetime1">
               <a:rPr lang="en-US" smtClean="0"/>
-              <a:t>10/11/2023</a:t>
+              <a:t>10/16/2023</a:t>
             </a:fld>
             <a:endParaRPr lang="en-US"/>
           </a:p>
@@ -1363,7 +1363,7 @@
           <a:p>
             <a:fld id="{A7DF85AE-E8A6-4C9A-906D-306CAA5182FB}" type="datetime1">
               <a:rPr lang="en-US" smtClean="0"/>
-              <a:t>10/11/2023</a:t>
+              <a:t>10/16/2023</a:t>
             </a:fld>
             <a:endParaRPr lang="en-US"/>
           </a:p>
@@ -1586,7 +1586,7 @@
           <a:p>
             <a:fld id="{7A9937A7-4A20-4D30-A46B-1AF396B80F56}" type="datetime1">
               <a:rPr lang="en-US" smtClean="0"/>
-              <a:t>10/11/2023</a:t>
+              <a:t>10/16/2023</a:t>
             </a:fld>
             <a:endParaRPr lang="en-US"/>
           </a:p>
@@ -26551,14 +26551,54 @@
               </a:spcBef>
             </a:pPr>
             <a:r>
+              <a:rPr sz="2400" spc="-5">
+                <a:solidFill>
+                  <a:srgbClr val="2A9FBB"/>
+                </a:solidFill>
+                <a:latin typeface="Courier New"/>
+                <a:cs typeface="Courier New"/>
+              </a:rPr>
+              <a:t>@</a:t>
+            </a:r>
+            <a:r>
+              <a:rPr lang="en-US" sz="2400" spc="-5">
+                <a:solidFill>
+                  <a:srgbClr val="2A9FBB"/>
+                </a:solidFill>
+                <a:latin typeface="Courier New"/>
+                <a:cs typeface="Courier New"/>
+              </a:rPr>
+              <a:t>When</a:t>
+            </a:r>
+            <a:r>
+              <a:rPr sz="2400" spc="-5">
+                <a:solidFill>
+                  <a:srgbClr val="404040"/>
+                </a:solidFill>
+                <a:latin typeface="Courier New"/>
+                <a:cs typeface="Courier New"/>
+              </a:rPr>
+              <a:t>(</a:t>
+            </a:r>
+            <a:r>
+              <a:rPr sz="2400" spc="-5">
+                <a:solidFill>
+                  <a:srgbClr val="779F31"/>
+                </a:solidFill>
+                <a:latin typeface="Courier New"/>
+                <a:cs typeface="Courier New"/>
+              </a:rPr>
+              <a:t>"^</a:t>
+            </a:r>
+            <a:r>
               <a:rPr sz="2400" spc="-5" dirty="0">
                 <a:solidFill>
-                  <a:srgbClr val="2A9FBB"/>
-                </a:solidFill>
-                <a:latin typeface="Courier New"/>
-                <a:cs typeface="Courier New"/>
-              </a:rPr>
-              <a:t>@Given</a:t>
+                  <a:srgbClr val="779F31"/>
+                </a:solidFill>
+                <a:latin typeface="Courier New"/>
+                <a:cs typeface="Courier New"/>
+              </a:rPr>
+              <a:t>s?he (?:orders|has ordered) (\\d+) (.*) smoothies?$"</a:t>
             </a:r>
             <a:r>
               <a:rPr sz="2400" spc="-5" dirty="0">
@@ -26568,30 +26608,70 @@
                 <a:latin typeface="Courier New"/>
                 <a:cs typeface="Courier New"/>
               </a:rPr>
-              <a:t>(</a:t>
+              <a:t>) </a:t>
+            </a:r>
+            <a:r>
+              <a:rPr sz="2400" spc="-1430" dirty="0">
+                <a:solidFill>
+                  <a:srgbClr val="404040"/>
+                </a:solidFill>
+                <a:latin typeface="Courier New"/>
+                <a:cs typeface="Courier New"/>
+              </a:rPr>
+              <a:t> </a:t>
             </a:r>
             <a:r>
               <a:rPr sz="2400" spc="-5" dirty="0">
                 <a:solidFill>
-                  <a:srgbClr val="779F31"/>
-                </a:solidFill>
-                <a:latin typeface="Courier New"/>
-                <a:cs typeface="Courier New"/>
-              </a:rPr>
-              <a:t>"^s?he (?:orders|has ordered) (\\d+) (.*) smoothies?$"</a:t>
+                  <a:srgbClr val="EF5A28"/>
+                </a:solidFill>
+                <a:latin typeface="Courier New"/>
+                <a:cs typeface="Courier New"/>
+              </a:rPr>
+              <a:t>public</a:t>
+            </a:r>
+            <a:r>
+              <a:rPr sz="2400" spc="-30" dirty="0">
+                <a:solidFill>
+                  <a:srgbClr val="EF5A28"/>
+                </a:solidFill>
+                <a:latin typeface="Courier New"/>
+                <a:cs typeface="Courier New"/>
+              </a:rPr>
+              <a:t> </a:t>
             </a:r>
             <a:r>
               <a:rPr sz="2400" spc="-5" dirty="0">
                 <a:solidFill>
+                  <a:srgbClr val="EF5A28"/>
+                </a:solidFill>
+                <a:latin typeface="Courier New"/>
+                <a:cs typeface="Courier New"/>
+              </a:rPr>
+              <a:t>void</a:t>
+            </a:r>
+            <a:r>
+              <a:rPr sz="2400" spc="-15" dirty="0">
+                <a:solidFill>
+                  <a:srgbClr val="EF5A28"/>
+                </a:solidFill>
+                <a:latin typeface="Courier New"/>
+                <a:cs typeface="Courier New"/>
+              </a:rPr>
+              <a:t> </a:t>
+            </a:r>
+            <a:r>
+              <a:rPr sz="2400" spc="-5" dirty="0">
+                <a:solidFill>
                   <a:srgbClr val="404040"/>
                 </a:solidFill>
                 <a:latin typeface="Courier New"/>
                 <a:cs typeface="Courier New"/>
               </a:rPr>
-              <a:t>) </a:t>
-            </a:r>
-            <a:r>
-              <a:rPr sz="2400" spc="-1430" dirty="0">
+              <a:t>hasOrdered(String</a:t>
+            </a:r>
+            <a:r>
+              <a:rPr sz="2400" spc="-40" dirty="0">
                 <a:solidFill>
                   <a:srgbClr val="404040"/>
                 </a:solidFill>
@@ -26603,74 +26683,14 @@
             <a:r>
               <a:rPr sz="2400" spc="-5" dirty="0">
                 <a:solidFill>
-                  <a:srgbClr val="EF5A28"/>
-                </a:solidFill>
-                <a:latin typeface="Courier New"/>
-                <a:cs typeface="Courier New"/>
-              </a:rPr>
-              <a:t>public</a:t>
-            </a:r>
-            <a:r>
-              <a:rPr sz="2400" spc="-30" dirty="0">
-                <a:solidFill>
-                  <a:srgbClr val="EF5A28"/>
-                </a:solidFill>
-                <a:latin typeface="Courier New"/>
-                <a:cs typeface="Courier New"/>
-              </a:rPr>
-              <a:t> </a:t>
-            </a:r>
-            <a:r>
-              <a:rPr sz="2400" spc="-5" dirty="0">
-                <a:solidFill>
-                  <a:srgbClr val="EF5A28"/>
-                </a:solidFill>
-                <a:latin typeface="Courier New"/>
-                <a:cs typeface="Courier New"/>
-              </a:rPr>
-              <a:t>void</a:t>
-            </a:r>
-            <a:r>
-              <a:rPr sz="2400" spc="-15" dirty="0">
-                <a:solidFill>
-                  <a:srgbClr val="EF5A28"/>
-                </a:solidFill>
-                <a:latin typeface="Courier New"/>
-                <a:cs typeface="Courier New"/>
-              </a:rPr>
-              <a:t> </a:t>
-            </a:r>
-            <a:r>
-              <a:rPr sz="2400" spc="-5" dirty="0">
-                <a:solidFill>
                   <a:srgbClr val="404040"/>
                 </a:solidFill>
                 <a:latin typeface="Courier New"/>
                 <a:cs typeface="Courier New"/>
               </a:rPr>
-              <a:t>hasOrdered(String</a:t>
-            </a:r>
-            <a:r>
-              <a:rPr sz="2400" spc="-40" dirty="0">
-                <a:solidFill>
-                  <a:srgbClr val="404040"/>
-                </a:solidFill>
-                <a:latin typeface="Courier New"/>
-                <a:cs typeface="Courier New"/>
-              </a:rPr>
-              <a:t> </a:t>
-            </a:r>
-            <a:r>
-              <a:rPr sz="2400" spc="-5" dirty="0">
-                <a:solidFill>
-                  <a:srgbClr val="404040"/>
-                </a:solidFill>
-                <a:latin typeface="Courier New"/>
-                <a:cs typeface="Courier New"/>
-              </a:rPr>
               <a:t>memberName,</a:t>
             </a:r>
-            <a:endParaRPr sz="2400">
+            <a:endParaRPr sz="2400" dirty="0">
               <a:latin typeface="Courier New"/>
               <a:cs typeface="Courier New"/>
             </a:endParaRPr>
@@ -26771,7 +26791,7 @@
               </a:rPr>
               <a:t>{…}</a:t>
             </a:r>
-            <a:endParaRPr sz="2400">
+            <a:endParaRPr sz="2400" dirty="0">
               <a:latin typeface="Courier New"/>
               <a:cs typeface="Courier New"/>
             </a:endParaRPr>
@@ -40193,7 +40213,7 @@
               </a:rPr>
               <a:t>},</a:t>
             </a:r>
-            <a:endParaRPr sz="2400">
+            <a:endParaRPr sz="2400" dirty="0">
               <a:latin typeface="Courier New"/>
               <a:cs typeface="Courier New"/>
             </a:endParaRPr>
@@ -40242,7 +40262,47 @@
                 <a:latin typeface="Courier New"/>
                 <a:cs typeface="Courier New"/>
               </a:rPr>
-              <a:t>"com.pluralsight.bdd.steps" </a:t>
+              <a:t>"</a:t>
+            </a:r>
+            <a:r>
+              <a:rPr sz="2400" spc="-10" dirty="0" err="1">
+                <a:solidFill>
+                  <a:srgbClr val="9BC750"/>
+                </a:solidFill>
+                <a:latin typeface="Courier New"/>
+                <a:cs typeface="Courier New"/>
+              </a:rPr>
+              <a:t>com.</a:t>
+            </a:r>
+            <a:r>
+              <a:rPr lang="en-US" sz="2400" spc="-10" dirty="0" err="1">
+                <a:solidFill>
+                  <a:srgbClr val="9BC750"/>
+                </a:solidFill>
+                <a:latin typeface="Courier New"/>
+                <a:cs typeface="Courier New"/>
+              </a:rPr>
+              <a:t>acme</a:t>
+            </a:r>
+            <a:r>
+              <a:rPr sz="2400" spc="-10" dirty="0" err="1">
+                <a:solidFill>
+                  <a:srgbClr val="9BC750"/>
+                </a:solidFill>
+                <a:latin typeface="Courier New"/>
+                <a:cs typeface="Courier New"/>
+              </a:rPr>
+              <a:t>.bdd.steps</a:t>
+            </a:r>
+            <a:r>
+              <a:rPr sz="2400" spc="-10" dirty="0">
+                <a:solidFill>
+                  <a:srgbClr val="9BC750"/>
+                </a:solidFill>
+                <a:latin typeface="Courier New"/>
+                <a:cs typeface="Courier New"/>
+              </a:rPr>
+              <a:t>" </a:t>
             </a:r>
             <a:r>
               <a:rPr sz="2400" spc="-1425" dirty="0">
@@ -40314,7 +40374,7 @@
               </a:rPr>
               <a:t>)</a:t>
             </a:r>
-            <a:endParaRPr sz="2400">
+            <a:endParaRPr sz="2400" dirty="0">
               <a:latin typeface="Courier New"/>
               <a:cs typeface="Courier New"/>
             </a:endParaRPr>
@@ -40395,7 +40455,7 @@
               </a:rPr>
               <a:t>{}</a:t>
             </a:r>
-            <a:endParaRPr sz="2400">
+            <a:endParaRPr sz="2400" dirty="0">
               <a:latin typeface="Courier New"/>
               <a:cs typeface="Courier New"/>
             </a:endParaRPr>

</xml_diff>